<commit_message>
Abstract updates. Overview figure update.
</commit_message>
<xml_diff>
--- a/docs/MICRO 2022/figures/compiler.pptx
+++ b/docs/MICRO 2022/figures/compiler.pptx
@@ -4812,13 +4812,13 @@
                   <a:defRPr/>
                 </a:pPr>
                 <a:r>
-                  <a:rPr lang="en-US" sz="2800" i="1" dirty="0" err="1">
+                  <a:rPr lang="en-US" sz="2800" i="1" dirty="0">
                     <a:solidFill>
                       <a:prstClr val="black"/>
                     </a:solidFill>
                     <a:latin typeface="Calibri" panose="020F0502020204030204"/>
                   </a:rPr>
-                  <a:t>TreeBeard</a:t>
+                  <a:t>Treebeard</a:t>
                 </a:r>
                 <a:endParaRPr lang="en-US" sz="2800" b="1" dirty="0">
                   <a:solidFill>
@@ -4887,7 +4887,34 @@
                   </a:solidFill>
                   <a:latin typeface="Calibri" panose="020F0502020204030204"/>
                 </a:rPr>
-                <a:t>Intel		AMD	Arm</a:t>
+                <a:t>x86		</a:t>
+              </a:r>
+              <a:r>
+                <a:rPr lang="en-US" sz="3900" dirty="0" err="1">
+                  <a:solidFill>
+                    <a:prstClr val="black"/>
+                  </a:solidFill>
+                  <a:latin typeface="Calibri" panose="020F0502020204030204"/>
+                </a:rPr>
+                <a:t>Risc</a:t>
+              </a:r>
+              <a:r>
+                <a:rPr lang="en-US" sz="3900">
+                  <a:solidFill>
+                    <a:prstClr val="black"/>
+                  </a:solidFill>
+                  <a:latin typeface="Calibri" panose="020F0502020204030204"/>
+                </a:rPr>
+                <a:t>-V</a:t>
+              </a:r>
+              <a:r>
+                <a:rPr lang="en-US" sz="3900" dirty="0">
+                  <a:solidFill>
+                    <a:prstClr val="black"/>
+                  </a:solidFill>
+                  <a:latin typeface="Calibri" panose="020F0502020204030204"/>
+                </a:rPr>
+                <a:t>	Arm</a:t>
               </a:r>
             </a:p>
           </p:txBody>
@@ -5468,7 +5495,7 @@
                   </a:solidFill>
                   <a:latin typeface="Calibri" panose="020F0502020204030204"/>
                 </a:rPr>
-                <a:t>vectorization</a:t>
+                <a:t>Vectorization</a:t>
               </a:r>
             </a:p>
           </p:txBody>
@@ -5758,7 +5785,7 @@
                 <a:defRPr/>
               </a:pPr>
               <a:r>
-                <a:rPr lang="en-US" sz="2800" err="1">
+                <a:rPr lang="en-US" sz="2800" dirty="0" err="1">
                   <a:solidFill>
                     <a:prstClr val="black"/>
                   </a:solidFill>
@@ -5767,7 +5794,7 @@
                 <a:t>XGBoost</a:t>
               </a:r>
               <a:r>
-                <a:rPr lang="en-US" sz="2800">
+                <a:rPr lang="en-US" sz="2800" dirty="0">
                   <a:solidFill>
                     <a:prstClr val="black"/>
                   </a:solidFill>
@@ -5776,15 +5803,15 @@
                 <a:t>      </a:t>
               </a:r>
               <a:r>
-                <a:rPr lang="en-US" sz="2800" err="1">
+                <a:rPr lang="en-US" sz="2800" dirty="0" err="1">
                   <a:solidFill>
                     <a:prstClr val="black"/>
                   </a:solidFill>
                   <a:latin typeface="Calibri" panose="020F0502020204030204"/>
                 </a:rPr>
-                <a:t>LIghtGBM</a:t>
+                <a:t>LightGBM</a:t>
               </a:r>
-              <a:endParaRPr lang="en-US" sz="2800">
+              <a:endParaRPr lang="en-US" sz="2800" dirty="0">
                 <a:solidFill>
                   <a:prstClr val="black"/>
                 </a:solidFill>
@@ -5864,7 +5891,7 @@
                 </a:solidFill>
                 <a:latin typeface="Calibri" panose="020F0502020204030204"/>
               </a:rPr>
-              <a:t>parallelize</a:t>
+              <a:t>Parallelize</a:t>
             </a:r>
           </a:p>
         </p:txBody>

</xml_diff>